<commit_message>
Adição do esquemático na apresentação
</commit_message>
<xml_diff>
--- a/Apresentação final.pptx
+++ b/Apresentação final.pptx
@@ -13,11 +13,12 @@
     <p:sldId id="267" r:id="rId7"/>
     <p:sldId id="268" r:id="rId8"/>
     <p:sldId id="269" r:id="rId9"/>
-    <p:sldId id="260" r:id="rId10"/>
-    <p:sldId id="261" r:id="rId11"/>
-    <p:sldId id="263" r:id="rId12"/>
-    <p:sldId id="265" r:id="rId13"/>
-    <p:sldId id="266" r:id="rId14"/>
+    <p:sldId id="270" r:id="rId10"/>
+    <p:sldId id="260" r:id="rId11"/>
+    <p:sldId id="261" r:id="rId12"/>
+    <p:sldId id="263" r:id="rId13"/>
+    <p:sldId id="265" r:id="rId14"/>
+    <p:sldId id="266" r:id="rId15"/>
   </p:sldIdLst>
   <p:sldSz cx="9144000" cy="6858000" type="screen4x3"/>
   <p:notesSz cx="6858000" cy="9144000"/>
@@ -259,7 +260,7 @@
           <a:p>
             <a:fld id="{10FE5BFE-EBFF-4D6E-8C56-06511E61A9FB}" type="datetimeFigureOut">
               <a:rPr lang="pt-BR" smtClean="0"/>
-              <a:t>30/11/2017</a:t>
+              <a:t>01/12/2017</a:t>
             </a:fld>
             <a:endParaRPr lang="pt-BR"/>
           </a:p>
@@ -429,7 +430,7 @@
           <a:p>
             <a:fld id="{10FE5BFE-EBFF-4D6E-8C56-06511E61A9FB}" type="datetimeFigureOut">
               <a:rPr lang="pt-BR" smtClean="0"/>
-              <a:t>30/11/2017</a:t>
+              <a:t>01/12/2017</a:t>
             </a:fld>
             <a:endParaRPr lang="pt-BR"/>
           </a:p>
@@ -609,7 +610,7 @@
           <a:p>
             <a:fld id="{10FE5BFE-EBFF-4D6E-8C56-06511E61A9FB}" type="datetimeFigureOut">
               <a:rPr lang="pt-BR" smtClean="0"/>
-              <a:t>30/11/2017</a:t>
+              <a:t>01/12/2017</a:t>
             </a:fld>
             <a:endParaRPr lang="pt-BR"/>
           </a:p>
@@ -779,7 +780,7 @@
           <a:p>
             <a:fld id="{10FE5BFE-EBFF-4D6E-8C56-06511E61A9FB}" type="datetimeFigureOut">
               <a:rPr lang="pt-BR" smtClean="0"/>
-              <a:t>30/11/2017</a:t>
+              <a:t>01/12/2017</a:t>
             </a:fld>
             <a:endParaRPr lang="pt-BR"/>
           </a:p>
@@ -1023,7 +1024,7 @@
           <a:p>
             <a:fld id="{10FE5BFE-EBFF-4D6E-8C56-06511E61A9FB}" type="datetimeFigureOut">
               <a:rPr lang="pt-BR" smtClean="0"/>
-              <a:t>30/11/2017</a:t>
+              <a:t>01/12/2017</a:t>
             </a:fld>
             <a:endParaRPr lang="pt-BR"/>
           </a:p>
@@ -1255,7 +1256,7 @@
           <a:p>
             <a:fld id="{10FE5BFE-EBFF-4D6E-8C56-06511E61A9FB}" type="datetimeFigureOut">
               <a:rPr lang="pt-BR" smtClean="0"/>
-              <a:t>30/11/2017</a:t>
+              <a:t>01/12/2017</a:t>
             </a:fld>
             <a:endParaRPr lang="pt-BR"/>
           </a:p>
@@ -1622,7 +1623,7 @@
           <a:p>
             <a:fld id="{10FE5BFE-EBFF-4D6E-8C56-06511E61A9FB}" type="datetimeFigureOut">
               <a:rPr lang="pt-BR" smtClean="0"/>
-              <a:t>30/11/2017</a:t>
+              <a:t>01/12/2017</a:t>
             </a:fld>
             <a:endParaRPr lang="pt-BR"/>
           </a:p>
@@ -1740,7 +1741,7 @@
           <a:p>
             <a:fld id="{10FE5BFE-EBFF-4D6E-8C56-06511E61A9FB}" type="datetimeFigureOut">
               <a:rPr lang="pt-BR" smtClean="0"/>
-              <a:t>30/11/2017</a:t>
+              <a:t>01/12/2017</a:t>
             </a:fld>
             <a:endParaRPr lang="pt-BR"/>
           </a:p>
@@ -1835,7 +1836,7 @@
           <a:p>
             <a:fld id="{10FE5BFE-EBFF-4D6E-8C56-06511E61A9FB}" type="datetimeFigureOut">
               <a:rPr lang="pt-BR" smtClean="0"/>
-              <a:t>30/11/2017</a:t>
+              <a:t>01/12/2017</a:t>
             </a:fld>
             <a:endParaRPr lang="pt-BR"/>
           </a:p>
@@ -2112,7 +2113,7 @@
           <a:p>
             <a:fld id="{10FE5BFE-EBFF-4D6E-8C56-06511E61A9FB}" type="datetimeFigureOut">
               <a:rPr lang="pt-BR" smtClean="0"/>
-              <a:t>30/11/2017</a:t>
+              <a:t>01/12/2017</a:t>
             </a:fld>
             <a:endParaRPr lang="pt-BR"/>
           </a:p>
@@ -2369,7 +2370,7 @@
           <a:p>
             <a:fld id="{10FE5BFE-EBFF-4D6E-8C56-06511E61A9FB}" type="datetimeFigureOut">
               <a:rPr lang="pt-BR" smtClean="0"/>
-              <a:t>30/11/2017</a:t>
+              <a:t>01/12/2017</a:t>
             </a:fld>
             <a:endParaRPr lang="pt-BR"/>
           </a:p>
@@ -2591,7 +2592,7 @@
           <a:p>
             <a:fld id="{10FE5BFE-EBFF-4D6E-8C56-06511E61A9FB}" type="datetimeFigureOut">
               <a:rPr lang="pt-BR" smtClean="0"/>
-              <a:t>30/11/2017</a:t>
+              <a:t>01/12/2017</a:t>
             </a:fld>
             <a:endParaRPr lang="pt-BR"/>
           </a:p>
@@ -3133,7 +3134,7 @@
           <p:cNvPr id="2" name="Título 1">
             <a:extLst>
               <a:ext uri="{FF2B5EF4-FFF2-40B4-BE49-F238E27FC236}">
-                <a16:creationId xmlns:a16="http://schemas.microsoft.com/office/drawing/2014/main" id="{BAC1D271-9194-4D7E-8A0E-55E354AD7DF0}"/>
+                <a16:creationId xmlns:a16="http://schemas.microsoft.com/office/drawing/2014/main" id="{DE3994CE-AB8D-4A4C-A28E-820EBF43DF17}"/>
               </a:ext>
             </a:extLst>
           </p:cNvPr>
@@ -3144,112 +3145,19 @@
             <p:ph type="title"/>
           </p:nvPr>
         </p:nvSpPr>
-        <p:spPr/>
-        <p:txBody>
-          <a:bodyPr/>
-          <a:lstStyle/>
-          <a:p>
-            <a:r>
-              <a:rPr lang="pt-BR" dirty="0"/>
-              <a:t>Tecnologias utilizadas</a:t>
-            </a:r>
-          </a:p>
-        </p:txBody>
-      </p:sp>
-      <p:sp>
-        <p:nvSpPr>
-          <p:cNvPr id="3" name="Espaço Reservado para Conteúdo 2">
-            <a:extLst>
-              <a:ext uri="{FF2B5EF4-FFF2-40B4-BE49-F238E27FC236}">
-                <a16:creationId xmlns:a16="http://schemas.microsoft.com/office/drawing/2014/main" id="{5F23A020-9674-4731-8973-9D325826DD1F}"/>
-              </a:ext>
-            </a:extLst>
-          </p:cNvPr>
-          <p:cNvSpPr>
-            <a:spLocks noGrp="1"/>
-          </p:cNvSpPr>
-          <p:nvPr>
-            <p:ph idx="1"/>
-          </p:nvPr>
-        </p:nvSpPr>
-        <p:spPr/>
-        <p:txBody>
-          <a:bodyPr/>
-          <a:lstStyle/>
-          <a:p>
-            <a:r>
-              <a:rPr lang="pt-BR" dirty="0"/>
-              <a:t>Linguagem C#</a:t>
-            </a:r>
-          </a:p>
-          <a:p>
-            <a:pPr lvl="1"/>
-            <a:r>
-              <a:rPr lang="pt-BR" dirty="0"/>
-              <a:t>Visual Studio – Licença da Microsoft</a:t>
-            </a:r>
-          </a:p>
-          <a:p>
-            <a:r>
-              <a:rPr lang="pt-BR" dirty="0" err="1"/>
-              <a:t>Github</a:t>
-            </a:r>
-            <a:r>
-              <a:rPr lang="pt-BR" dirty="0"/>
-              <a:t> </a:t>
-            </a:r>
-          </a:p>
-          <a:p>
-            <a:r>
-              <a:rPr lang="pt-BR" dirty="0" err="1"/>
-              <a:t>Xamarin</a:t>
-            </a:r>
-            <a:endParaRPr lang="pt-BR" dirty="0"/>
-          </a:p>
-          <a:p>
-            <a:pPr lvl="1"/>
-            <a:r>
-              <a:rPr lang="pt-BR" dirty="0"/>
-              <a:t>Ambiente de desenvolvimento </a:t>
-            </a:r>
-            <a:r>
-              <a:rPr lang="pt-BR" dirty="0" err="1"/>
-              <a:t>Android</a:t>
-            </a:r>
-            <a:endParaRPr lang="pt-BR" dirty="0"/>
-          </a:p>
-          <a:p>
-            <a:r>
-              <a:rPr lang="pt-BR" dirty="0"/>
-              <a:t>Web API</a:t>
-            </a:r>
-          </a:p>
-          <a:p>
-            <a:pPr lvl="1"/>
-            <a:r>
-              <a:rPr lang="pt-BR" dirty="0"/>
-              <a:t>Servidor </a:t>
-            </a:r>
-            <a:r>
-              <a:rPr lang="pt-BR" dirty="0" err="1"/>
-              <a:t>Azure</a:t>
-            </a:r>
-            <a:r>
-              <a:rPr lang="pt-BR" dirty="0"/>
-              <a:t> – Licença da Microsoft</a:t>
-            </a:r>
-          </a:p>
-          <a:p>
-            <a:r>
-              <a:rPr lang="pt-BR" dirty="0"/>
-              <a:t>Arduino</a:t>
-            </a:r>
-          </a:p>
-          <a:p>
-            <a:pPr lvl="1"/>
-            <a:r>
-              <a:rPr lang="pt-BR" dirty="0"/>
-              <a:t>TCRT 5000</a:t>
+        <p:spPr>
+          <a:xfrm>
+            <a:off x="1257300" y="2573754"/>
+            <a:ext cx="7886700" cy="1325563"/>
+          </a:xfrm>
+        </p:spPr>
+        <p:txBody>
+          <a:bodyPr/>
+          <a:lstStyle/>
+          <a:p>
+            <a:r>
+              <a:rPr lang="pt-BR" b="1" dirty="0"/>
+              <a:t>Demonstração do aplicativo</a:t>
             </a:r>
           </a:p>
         </p:txBody>
@@ -3257,7 +3165,7 @@
     </p:spTree>
     <p:extLst>
       <p:ext uri="{BB962C8B-B14F-4D97-AF65-F5344CB8AC3E}">
-        <p14:creationId xmlns:p14="http://schemas.microsoft.com/office/powerpoint/2010/main" val="4073119967"/>
+        <p14:creationId xmlns:p14="http://schemas.microsoft.com/office/powerpoint/2010/main" val="264950145"/>
       </p:ext>
     </p:extLst>
   </p:cSld>
@@ -3335,7 +3243,7 @@
           <a:p>
             <a:r>
               <a:rPr lang="pt-BR" dirty="0"/>
-              <a:t>Linguagem HTML</a:t>
+              <a:t>Linguagem C#</a:t>
             </a:r>
           </a:p>
           <a:p>
@@ -3346,22 +3254,66 @@
             </a:r>
           </a:p>
           <a:p>
-            <a:pPr marL="457200" lvl="1" indent="0">
-              <a:buNone/>
-            </a:pPr>
+            <a:r>
+              <a:rPr lang="pt-BR" dirty="0" err="1"/>
+              <a:t>Github</a:t>
+            </a:r>
+            <a:r>
+              <a:rPr lang="pt-BR" dirty="0"/>
+              <a:t> </a:t>
+            </a:r>
+          </a:p>
+          <a:p>
+            <a:r>
+              <a:rPr lang="pt-BR" dirty="0" err="1"/>
+              <a:t>Xamarin</a:t>
+            </a:r>
             <a:endParaRPr lang="pt-BR" dirty="0"/>
           </a:p>
           <a:p>
+            <a:pPr lvl="1"/>
             <a:r>
               <a:rPr lang="pt-BR" dirty="0"/>
-              <a:t>MySQL server</a:t>
+              <a:t>Ambiente de desenvolvimento </a:t>
+            </a:r>
+            <a:r>
+              <a:rPr lang="pt-BR" dirty="0" err="1"/>
+              <a:t>Android</a:t>
+            </a:r>
+            <a:endParaRPr lang="pt-BR" dirty="0"/>
+          </a:p>
+          <a:p>
+            <a:r>
+              <a:rPr lang="pt-BR" dirty="0"/>
+              <a:t>Web API</a:t>
             </a:r>
           </a:p>
           <a:p>
             <a:pPr lvl="1"/>
             <a:r>
               <a:rPr lang="pt-BR" dirty="0"/>
-              <a:t>Banco de dados</a:t>
+              <a:t>Servidor </a:t>
+            </a:r>
+            <a:r>
+              <a:rPr lang="pt-BR" dirty="0" err="1"/>
+              <a:t>Azure</a:t>
+            </a:r>
+            <a:r>
+              <a:rPr lang="pt-BR" dirty="0"/>
+              <a:t> – Licença da Microsoft</a:t>
+            </a:r>
+          </a:p>
+          <a:p>
+            <a:r>
+              <a:rPr lang="pt-BR" dirty="0"/>
+              <a:t>Arduino</a:t>
+            </a:r>
+          </a:p>
+          <a:p>
+            <a:pPr lvl="1"/>
+            <a:r>
+              <a:rPr lang="pt-BR" dirty="0"/>
+              <a:t>TCRT 5000</a:t>
             </a:r>
           </a:p>
         </p:txBody>
@@ -3369,7 +3321,7 @@
     </p:spTree>
     <p:extLst>
       <p:ext uri="{BB962C8B-B14F-4D97-AF65-F5344CB8AC3E}">
-        <p14:creationId xmlns:p14="http://schemas.microsoft.com/office/powerpoint/2010/main" val="2614544503"/>
+        <p14:creationId xmlns:p14="http://schemas.microsoft.com/office/powerpoint/2010/main" val="4073119967"/>
       </p:ext>
     </p:extLst>
   </p:cSld>
@@ -3401,6 +3353,118 @@
           <p:cNvPr id="2" name="Título 1">
             <a:extLst>
               <a:ext uri="{FF2B5EF4-FFF2-40B4-BE49-F238E27FC236}">
+                <a16:creationId xmlns:a16="http://schemas.microsoft.com/office/drawing/2014/main" id="{BAC1D271-9194-4D7E-8A0E-55E354AD7DF0}"/>
+              </a:ext>
+            </a:extLst>
+          </p:cNvPr>
+          <p:cNvSpPr>
+            <a:spLocks noGrp="1"/>
+          </p:cNvSpPr>
+          <p:nvPr>
+            <p:ph type="title"/>
+          </p:nvPr>
+        </p:nvSpPr>
+        <p:spPr/>
+        <p:txBody>
+          <a:bodyPr/>
+          <a:lstStyle/>
+          <a:p>
+            <a:r>
+              <a:rPr lang="pt-BR" dirty="0"/>
+              <a:t>Tecnologias utilizadas</a:t>
+            </a:r>
+          </a:p>
+        </p:txBody>
+      </p:sp>
+      <p:sp>
+        <p:nvSpPr>
+          <p:cNvPr id="3" name="Espaço Reservado para Conteúdo 2">
+            <a:extLst>
+              <a:ext uri="{FF2B5EF4-FFF2-40B4-BE49-F238E27FC236}">
+                <a16:creationId xmlns:a16="http://schemas.microsoft.com/office/drawing/2014/main" id="{5F23A020-9674-4731-8973-9D325826DD1F}"/>
+              </a:ext>
+            </a:extLst>
+          </p:cNvPr>
+          <p:cNvSpPr>
+            <a:spLocks noGrp="1"/>
+          </p:cNvSpPr>
+          <p:nvPr>
+            <p:ph idx="1"/>
+          </p:nvPr>
+        </p:nvSpPr>
+        <p:spPr/>
+        <p:txBody>
+          <a:bodyPr/>
+          <a:lstStyle/>
+          <a:p>
+            <a:r>
+              <a:rPr lang="pt-BR" dirty="0"/>
+              <a:t>Linguagem HTML</a:t>
+            </a:r>
+          </a:p>
+          <a:p>
+            <a:pPr lvl="1"/>
+            <a:r>
+              <a:rPr lang="pt-BR" dirty="0"/>
+              <a:t>Visual Studio – Licença da Microsoft</a:t>
+            </a:r>
+          </a:p>
+          <a:p>
+            <a:pPr marL="457200" lvl="1" indent="0">
+              <a:buNone/>
+            </a:pPr>
+            <a:endParaRPr lang="pt-BR" dirty="0"/>
+          </a:p>
+          <a:p>
+            <a:r>
+              <a:rPr lang="pt-BR" dirty="0"/>
+              <a:t>MySQL server</a:t>
+            </a:r>
+          </a:p>
+          <a:p>
+            <a:pPr lvl="1"/>
+            <a:r>
+              <a:rPr lang="pt-BR" dirty="0"/>
+              <a:t>Banco de dados</a:t>
+            </a:r>
+          </a:p>
+        </p:txBody>
+      </p:sp>
+    </p:spTree>
+    <p:extLst>
+      <p:ext uri="{BB962C8B-B14F-4D97-AF65-F5344CB8AC3E}">
+        <p14:creationId xmlns:p14="http://schemas.microsoft.com/office/powerpoint/2010/main" val="2614544503"/>
+      </p:ext>
+    </p:extLst>
+  </p:cSld>
+  <p:clrMapOvr>
+    <a:masterClrMapping/>
+  </p:clrMapOvr>
+</p:sld>
+</file>
+
+<file path=ppt/slides/slide13.xml><?xml version="1.0" encoding="utf-8"?>
+<p:sld xmlns:a="http://schemas.openxmlformats.org/drawingml/2006/main" xmlns:r="http://schemas.openxmlformats.org/officeDocument/2006/relationships" xmlns:p="http://schemas.openxmlformats.org/presentationml/2006/main">
+  <p:cSld>
+    <p:spTree>
+      <p:nvGrpSpPr>
+        <p:cNvPr id="1" name=""/>
+        <p:cNvGrpSpPr/>
+        <p:nvPr/>
+      </p:nvGrpSpPr>
+      <p:grpSpPr>
+        <a:xfrm>
+          <a:off x="0" y="0"/>
+          <a:ext cx="0" cy="0"/>
+          <a:chOff x="0" y="0"/>
+          <a:chExt cx="0" cy="0"/>
+        </a:xfrm>
+      </p:grpSpPr>
+      <p:sp>
+        <p:nvSpPr>
+          <p:cNvPr id="2" name="Título 1">
+            <a:extLst>
+              <a:ext uri="{FF2B5EF4-FFF2-40B4-BE49-F238E27FC236}">
                 <a16:creationId xmlns:a16="http://schemas.microsoft.com/office/drawing/2014/main" id="{33651087-A362-4E32-87E4-2A900E7AC43B}"/>
               </a:ext>
             </a:extLst>
@@ -3442,7 +3506,7 @@
 </p:sld>
 </file>
 
-<file path=ppt/slides/slide13.xml><?xml version="1.0" encoding="utf-8"?>
+<file path=ppt/slides/slide14.xml><?xml version="1.0" encoding="utf-8"?>
 <p:sld xmlns:a="http://schemas.openxmlformats.org/drawingml/2006/main" xmlns:r="http://schemas.openxmlformats.org/officeDocument/2006/relationships" xmlns:p="http://schemas.openxmlformats.org/presentationml/2006/main">
   <p:cSld>
     <p:spTree>
@@ -4279,7 +4343,7 @@
           <p:cNvPr id="2" name="Título 1">
             <a:extLst>
               <a:ext uri="{FF2B5EF4-FFF2-40B4-BE49-F238E27FC236}">
-                <a16:creationId xmlns:a16="http://schemas.microsoft.com/office/drawing/2014/main" id="{DE3994CE-AB8D-4A4C-A28E-820EBF43DF17}"/>
+                <a16:creationId xmlns:a16="http://schemas.microsoft.com/office/drawing/2014/main" id="{A22863CE-B98D-496C-AAEC-10959E37933F}"/>
               </a:ext>
             </a:extLst>
           </p:cNvPr>
@@ -4290,19 +4354,119 @@
             <p:ph type="title"/>
           </p:nvPr>
         </p:nvSpPr>
+        <p:spPr/>
+        <p:txBody>
+          <a:bodyPr/>
+          <a:lstStyle/>
+          <a:p>
+            <a:r>
+              <a:rPr lang="pt-BR" dirty="0"/>
+              <a:t>Integração com o </a:t>
+            </a:r>
+            <a:r>
+              <a:rPr lang="pt-BR" dirty="0" err="1"/>
+              <a:t>Arduino</a:t>
+            </a:r>
+            <a:endParaRPr lang="pt-BR" dirty="0"/>
+          </a:p>
+        </p:txBody>
+      </p:sp>
+      <p:pic>
+        <p:nvPicPr>
+          <p:cNvPr id="1026" name="Picture 2" descr="Esquemático do arduino.png">
+            <a:extLst>
+              <a:ext uri="{FF2B5EF4-FFF2-40B4-BE49-F238E27FC236}">
+                <a16:creationId xmlns:a16="http://schemas.microsoft.com/office/drawing/2014/main" id="{1B9E7CD7-B188-48FA-BF57-C7C88D157068}"/>
+              </a:ext>
+            </a:extLst>
+          </p:cNvPr>
+          <p:cNvPicPr>
+            <a:picLocks noChangeAspect="1" noChangeArrowheads="1"/>
+          </p:cNvPicPr>
+          <p:nvPr/>
+        </p:nvPicPr>
+        <p:blipFill rotWithShape="1">
+          <a:blip r:embed="rId2">
+            <a:extLst>
+              <a:ext uri="{28A0092B-C50C-407E-A947-70E740481C1C}">
+                <a14:useLocalDpi xmlns:a14="http://schemas.microsoft.com/office/drawing/2010/main" val="0"/>
+              </a:ext>
+            </a:extLst>
+          </a:blip>
+          <a:srcRect t="6424"/>
+          <a:stretch/>
+        </p:blipFill>
+        <p:spPr bwMode="auto">
+          <a:xfrm>
+            <a:off x="568303" y="1386432"/>
+            <a:ext cx="8007394" cy="4085135"/>
+          </a:xfrm>
+          <a:prstGeom prst="rect">
+            <a:avLst/>
+          </a:prstGeom>
+          <a:noFill/>
+          <a:extLst>
+            <a:ext uri="{909E8E84-426E-40DD-AFC4-6F175D3DCCD1}">
+              <a14:hiddenFill xmlns:a14="http://schemas.microsoft.com/office/drawing/2010/main">
+                <a:solidFill>
+                  <a:srgbClr val="FFFFFF"/>
+                </a:solidFill>
+              </a14:hiddenFill>
+            </a:ext>
+          </a:extLst>
+        </p:spPr>
+      </p:pic>
+      <p:sp>
+        <p:nvSpPr>
+          <p:cNvPr id="4" name="Espaço Reservado para Conteúdo 3">
+            <a:extLst>
+              <a:ext uri="{FF2B5EF4-FFF2-40B4-BE49-F238E27FC236}">
+                <a16:creationId xmlns:a16="http://schemas.microsoft.com/office/drawing/2014/main" id="{57090B1D-3C09-458E-920B-D1FEDC089D71}"/>
+              </a:ext>
+            </a:extLst>
+          </p:cNvPr>
+          <p:cNvSpPr>
+            <a:spLocks noGrp="1"/>
+          </p:cNvSpPr>
+          <p:nvPr>
+            <p:ph idx="1"/>
+          </p:nvPr>
+        </p:nvSpPr>
         <p:spPr>
           <a:xfrm>
-            <a:off x="1257300" y="2573754"/>
-            <a:ext cx="7886700" cy="1325563"/>
+            <a:off x="628650" y="5113222"/>
+            <a:ext cx="7886700" cy="817315"/>
           </a:xfrm>
         </p:spPr>
         <p:txBody>
-          <a:bodyPr/>
-          <a:lstStyle/>
-          <a:p>
-            <a:r>
-              <a:rPr lang="pt-BR" b="1" dirty="0"/>
-              <a:t>Demonstração do aplicativo</a:t>
+          <a:bodyPr>
+            <a:normAutofit fontScale="92500"/>
+          </a:bodyPr>
+          <a:lstStyle/>
+          <a:p>
+            <a:r>
+              <a:rPr lang="pt-BR" sz="1200" dirty="0"/>
+              <a:t>Programe as portas de 2 até 6 na forma de um vetor de 5 bits para corresponder a sensibilidade do controlador. </a:t>
+            </a:r>
+          </a:p>
+          <a:p>
+            <a:r>
+              <a:rPr lang="pt-BR" sz="1200" dirty="0"/>
+              <a:t>Programe as portas de 7 até 9 na forma de um vetor de 3 bits para corresponder à quantidade de sensores. Programe até 6</a:t>
+            </a:r>
+          </a:p>
+          <a:p>
+            <a:r>
+              <a:rPr lang="pt-BR" sz="1200" dirty="0"/>
+              <a:t>Cada porta analógica do </a:t>
+            </a:r>
+            <a:r>
+              <a:rPr lang="pt-BR" sz="1200" dirty="0" err="1"/>
+              <a:t>Arduino</a:t>
+            </a:r>
+            <a:r>
+              <a:rPr lang="pt-BR" sz="1200" dirty="0"/>
+              <a:t> corresponde à uma vaga. No máximo 6 vagas podem ser gerenciadas sem multiplexação;</a:t>
             </a:r>
           </a:p>
         </p:txBody>
@@ -4310,7 +4474,7 @@
     </p:spTree>
     <p:extLst>
       <p:ext uri="{BB962C8B-B14F-4D97-AF65-F5344CB8AC3E}">
-        <p14:creationId xmlns:p14="http://schemas.microsoft.com/office/powerpoint/2010/main" val="264950145"/>
+        <p14:creationId xmlns:p14="http://schemas.microsoft.com/office/powerpoint/2010/main" val="143902728"/>
       </p:ext>
     </p:extLst>
   </p:cSld>

</xml_diff>